<commit_message>
inprogress update practical5 help
</commit_message>
<xml_diff>
--- a/slides/On-Campus/11_03_UML_PracticalProject.pptx
+++ b/slides/On-Campus/11_03_UML_PracticalProject.pptx
@@ -5,15 +5,17 @@
     <p:sldMasterId id="2147483648" r:id="rId1"/>
   </p:sldMasterIdLst>
   <p:notesMasterIdLst>
-    <p:notesMasterId r:id="rId5"/>
+    <p:notesMasterId r:id="rId7"/>
   </p:notesMasterIdLst>
   <p:handoutMasterIdLst>
-    <p:handoutMasterId r:id="rId6"/>
+    <p:handoutMasterId r:id="rId8"/>
   </p:handoutMasterIdLst>
   <p:sldIdLst>
     <p:sldId id="256" r:id="rId2"/>
     <p:sldId id="257" r:id="rId3"/>
     <p:sldId id="258" r:id="rId4"/>
+    <p:sldId id="259" r:id="rId5"/>
+    <p:sldId id="260" r:id="rId6"/>
   </p:sldIdLst>
   <p:sldSz cx="13817600" cy="7772400"/>
   <p:notesSz cx="6858000" cy="9144000"/>
@@ -216,7 +218,7 @@
           <a:p>
             <a:fld id="{4D7E51A5-B478-1E40-8CBB-0DAA8831E99D}" type="datetimeFigureOut">
               <a:rPr lang="en-US" smtClean="0"/>
-              <a:t>4/18/20</a:t>
+              <a:t>11/4/21</a:t>
             </a:fld>
             <a:endParaRPr lang="en-US"/>
           </a:p>
@@ -381,7 +383,7 @@
           <a:p>
             <a:fld id="{D0ED587F-861E-6740-9643-E3DDAE89B8D6}" type="datetimeFigureOut">
               <a:rPr lang="en-US" smtClean="0"/>
-              <a:t>4/18/20</a:t>
+              <a:t>11/4/21</a:t>
             </a:fld>
             <a:endParaRPr lang="en-US"/>
           </a:p>
@@ -7287,10 +7289,1907 @@
           </a:p>
         </p:txBody>
       </p:sp>
+      <p:graphicFrame>
+        <p:nvGraphicFramePr>
+          <p:cNvPr id="9" name="Table 9">
+            <a:extLst>
+              <a:ext uri="{FF2B5EF4-FFF2-40B4-BE49-F238E27FC236}">
+                <a16:creationId xmlns:a16="http://schemas.microsoft.com/office/drawing/2014/main" id="{FCECC7A4-F2DD-B642-8DE9-059F704ED98B}"/>
+              </a:ext>
+            </a:extLst>
+          </p:cNvPr>
+          <p:cNvGraphicFramePr>
+            <a:graphicFrameLocks noGrp="1"/>
+          </p:cNvGraphicFramePr>
+          <p:nvPr>
+            <p:extLst>
+              <p:ext uri="{D42A27DB-BD31-4B8C-83A1-F6EECF244321}">
+                <p14:modId xmlns:p14="http://schemas.microsoft.com/office/powerpoint/2010/main" val="2043130520"/>
+              </p:ext>
+            </p:extLst>
+          </p:nvPr>
+        </p:nvGraphicFramePr>
+        <p:xfrm>
+          <a:off x="8669738" y="234598"/>
+          <a:ext cx="5003802" cy="2542822"/>
+        </p:xfrm>
+        <a:graphic>
+          <a:graphicData uri="http://schemas.openxmlformats.org/drawingml/2006/table">
+            <a:tbl>
+              <a:tblPr firstRow="1" bandRow="1">
+                <a:tableStyleId>{5C22544A-7EE6-4342-B048-85BDC9FD1C3A}</a:tableStyleId>
+              </a:tblPr>
+              <a:tblGrid>
+                <a:gridCol w="2501901">
+                  <a:extLst>
+                    <a:ext uri="{9D8B030D-6E8A-4147-A177-3AD203B41FA5}">
+                      <a16:colId xmlns:a16="http://schemas.microsoft.com/office/drawing/2014/main" val="3399769833"/>
+                    </a:ext>
+                  </a:extLst>
+                </a:gridCol>
+                <a:gridCol w="2501901">
+                  <a:extLst>
+                    <a:ext uri="{9D8B030D-6E8A-4147-A177-3AD203B41FA5}">
+                      <a16:colId xmlns:a16="http://schemas.microsoft.com/office/drawing/2014/main" val="2056830325"/>
+                    </a:ext>
+                  </a:extLst>
+                </a:gridCol>
+              </a:tblGrid>
+              <a:tr h="637822">
+                <a:tc>
+                  <a:txBody>
+                    <a:bodyPr/>
+                    <a:lstStyle/>
+                    <a:p>
+                      <a:r>
+                        <a:rPr lang="en-US" dirty="0"/>
+                        <a:t>Symbol</a:t>
+                      </a:r>
+                    </a:p>
+                  </a:txBody>
+                  <a:tcPr/>
+                </a:tc>
+                <a:tc>
+                  <a:txBody>
+                    <a:bodyPr/>
+                    <a:lstStyle/>
+                    <a:p>
+                      <a:r>
+                        <a:rPr lang="en-US" dirty="0"/>
+                        <a:t>Meaning</a:t>
+                      </a:r>
+                    </a:p>
+                  </a:txBody>
+                  <a:tcPr/>
+                </a:tc>
+                <a:extLst>
+                  <a:ext uri="{0D108BD9-81ED-4DB2-BD59-A6C34878D82A}">
+                    <a16:rowId xmlns:a16="http://schemas.microsoft.com/office/drawing/2014/main" val="3715280727"/>
+                  </a:ext>
+                </a:extLst>
+              </a:tr>
+              <a:tr h="635000">
+                <a:tc>
+                  <a:txBody>
+                    <a:bodyPr/>
+                    <a:lstStyle/>
+                    <a:p>
+                      <a:pPr algn="ctr"/>
+                      <a:r>
+                        <a:rPr lang="en-US" dirty="0"/>
+                        <a:t>+</a:t>
+                      </a:r>
+                    </a:p>
+                  </a:txBody>
+                  <a:tcPr/>
+                </a:tc>
+                <a:tc>
+                  <a:txBody>
+                    <a:bodyPr/>
+                    <a:lstStyle/>
+                    <a:p>
+                      <a:r>
+                        <a:rPr lang="en-US" dirty="0"/>
+                        <a:t>public</a:t>
+                      </a:r>
+                    </a:p>
+                  </a:txBody>
+                  <a:tcPr/>
+                </a:tc>
+                <a:extLst>
+                  <a:ext uri="{0D108BD9-81ED-4DB2-BD59-A6C34878D82A}">
+                    <a16:rowId xmlns:a16="http://schemas.microsoft.com/office/drawing/2014/main" val="2887089301"/>
+                  </a:ext>
+                </a:extLst>
+              </a:tr>
+              <a:tr h="635000">
+                <a:tc>
+                  <a:txBody>
+                    <a:bodyPr/>
+                    <a:lstStyle/>
+                    <a:p>
+                      <a:pPr algn="ctr"/>
+                      <a:r>
+                        <a:rPr lang="en-US" dirty="0"/>
+                        <a:t>#</a:t>
+                      </a:r>
+                    </a:p>
+                  </a:txBody>
+                  <a:tcPr/>
+                </a:tc>
+                <a:tc>
+                  <a:txBody>
+                    <a:bodyPr/>
+                    <a:lstStyle/>
+                    <a:p>
+                      <a:r>
+                        <a:rPr lang="en-US" dirty="0"/>
+                        <a:t>protected</a:t>
+                      </a:r>
+                    </a:p>
+                  </a:txBody>
+                  <a:tcPr/>
+                </a:tc>
+                <a:extLst>
+                  <a:ext uri="{0D108BD9-81ED-4DB2-BD59-A6C34878D82A}">
+                    <a16:rowId xmlns:a16="http://schemas.microsoft.com/office/drawing/2014/main" val="4124071604"/>
+                  </a:ext>
+                </a:extLst>
+              </a:tr>
+              <a:tr h="635000">
+                <a:tc>
+                  <a:txBody>
+                    <a:bodyPr/>
+                    <a:lstStyle/>
+                    <a:p>
+                      <a:pPr algn="ctr"/>
+                      <a:r>
+                        <a:rPr lang="en-US" dirty="0"/>
+                        <a:t>-</a:t>
+                      </a:r>
+                    </a:p>
+                  </a:txBody>
+                  <a:tcPr/>
+                </a:tc>
+                <a:tc>
+                  <a:txBody>
+                    <a:bodyPr/>
+                    <a:lstStyle/>
+                    <a:p>
+                      <a:r>
+                        <a:rPr lang="en-US" dirty="0"/>
+                        <a:t>private</a:t>
+                      </a:r>
+                    </a:p>
+                  </a:txBody>
+                  <a:tcPr/>
+                </a:tc>
+                <a:extLst>
+                  <a:ext uri="{0D108BD9-81ED-4DB2-BD59-A6C34878D82A}">
+                    <a16:rowId xmlns:a16="http://schemas.microsoft.com/office/drawing/2014/main" val="4005782891"/>
+                  </a:ext>
+                </a:extLst>
+              </a:tr>
+            </a:tbl>
+          </a:graphicData>
+        </a:graphic>
+      </p:graphicFrame>
     </p:spTree>
     <p:extLst>
       <p:ext uri="{BB962C8B-B14F-4D97-AF65-F5344CB8AC3E}">
         <p14:creationId xmlns:p14="http://schemas.microsoft.com/office/powerpoint/2010/main" val="867140636"/>
+      </p:ext>
+    </p:extLst>
+  </p:cSld>
+  <p:clrMapOvr>
+    <a:masterClrMapping/>
+  </p:clrMapOvr>
+  <mc:AlternateContent xmlns:mc="http://schemas.openxmlformats.org/markup-compatibility/2006" xmlns:p14="http://schemas.microsoft.com/office/powerpoint/2010/main">
+    <mc:Choice Requires="p14">
+      <p:transition p14:dur="300">
+        <p:fade/>
+      </p:transition>
+    </mc:Choice>
+    <mc:Fallback xmlns="">
+      <p:transition>
+        <p:fade/>
+      </p:transition>
+    </mc:Fallback>
+  </mc:AlternateContent>
+</p:sld>
+</file>
+
+<file path=ppt/slides/slide4.xml><?xml version="1.0" encoding="utf-8"?>
+<p:sld xmlns:a="http://schemas.openxmlformats.org/drawingml/2006/main" xmlns:r="http://schemas.openxmlformats.org/officeDocument/2006/relationships" xmlns:p="http://schemas.openxmlformats.org/presentationml/2006/main">
+  <p:cSld>
+    <p:spTree>
+      <p:nvGrpSpPr>
+        <p:cNvPr id="1" name=""/>
+        <p:cNvGrpSpPr/>
+        <p:nvPr/>
+      </p:nvGrpSpPr>
+      <p:grpSpPr>
+        <a:xfrm>
+          <a:off x="0" y="0"/>
+          <a:ext cx="0" cy="0"/>
+          <a:chOff x="0" y="0"/>
+          <a:chExt cx="0" cy="0"/>
+        </a:xfrm>
+      </p:grpSpPr>
+      <p:sp>
+        <p:nvSpPr>
+          <p:cNvPr id="2" name="Title 1">
+            <a:extLst>
+              <a:ext uri="{FF2B5EF4-FFF2-40B4-BE49-F238E27FC236}">
+                <a16:creationId xmlns:a16="http://schemas.microsoft.com/office/drawing/2014/main" id="{198D3D02-1994-1C46-A4B9-6C62C4E5779D}"/>
+              </a:ext>
+            </a:extLst>
+          </p:cNvPr>
+          <p:cNvSpPr>
+            <a:spLocks noGrp="1"/>
+          </p:cNvSpPr>
+          <p:nvPr>
+            <p:ph type="title"/>
+          </p:nvPr>
+        </p:nvSpPr>
+        <p:spPr>
+          <a:xfrm>
+            <a:off x="628075" y="546437"/>
+            <a:ext cx="5549901" cy="1015663"/>
+          </a:xfrm>
+        </p:spPr>
+        <p:txBody>
+          <a:bodyPr/>
+          <a:lstStyle/>
+          <a:p>
+            <a:r>
+              <a:rPr lang="en-US" dirty="0"/>
+              <a:t>Translating to Code</a:t>
+            </a:r>
+          </a:p>
+        </p:txBody>
+      </p:sp>
+      <p:pic>
+        <p:nvPicPr>
+          <p:cNvPr id="4" name="Picture 3">
+            <a:extLst>
+              <a:ext uri="{FF2B5EF4-FFF2-40B4-BE49-F238E27FC236}">
+                <a16:creationId xmlns:a16="http://schemas.microsoft.com/office/drawing/2014/main" id="{95DA0495-0009-3041-8225-C3B67F094150}"/>
+              </a:ext>
+            </a:extLst>
+          </p:cNvPr>
+          <p:cNvPicPr>
+            <a:picLocks noChangeAspect="1"/>
+          </p:cNvPicPr>
+          <p:nvPr/>
+        </p:nvPicPr>
+        <p:blipFill>
+          <a:blip r:embed="rId2"/>
+          <a:stretch>
+            <a:fillRect/>
+          </a:stretch>
+        </p:blipFill>
+        <p:spPr>
+          <a:xfrm>
+            <a:off x="8070850" y="1754318"/>
+            <a:ext cx="5549900" cy="1905000"/>
+          </a:xfrm>
+          <a:prstGeom prst="rect">
+            <a:avLst/>
+          </a:prstGeom>
+        </p:spPr>
+      </p:pic>
+      <p:pic>
+        <p:nvPicPr>
+          <p:cNvPr id="5" name="Picture 4">
+            <a:extLst>
+              <a:ext uri="{FF2B5EF4-FFF2-40B4-BE49-F238E27FC236}">
+                <a16:creationId xmlns:a16="http://schemas.microsoft.com/office/drawing/2014/main" id="{68247DCC-6214-7346-A589-2AEEFE4673B6}"/>
+              </a:ext>
+            </a:extLst>
+          </p:cNvPr>
+          <p:cNvPicPr>
+            <a:picLocks noChangeAspect="1"/>
+          </p:cNvPicPr>
+          <p:nvPr/>
+        </p:nvPicPr>
+        <p:blipFill>
+          <a:blip r:embed="rId3"/>
+          <a:stretch>
+            <a:fillRect/>
+          </a:stretch>
+        </p:blipFill>
+        <p:spPr>
+          <a:xfrm>
+            <a:off x="9506656" y="112582"/>
+            <a:ext cx="2743200" cy="1231900"/>
+          </a:xfrm>
+          <a:prstGeom prst="rect">
+            <a:avLst/>
+          </a:prstGeom>
+        </p:spPr>
+      </p:pic>
+      <p:cxnSp>
+        <p:nvCxnSpPr>
+          <p:cNvPr id="6" name="Straight Arrow Connector 5">
+            <a:extLst>
+              <a:ext uri="{FF2B5EF4-FFF2-40B4-BE49-F238E27FC236}">
+                <a16:creationId xmlns:a16="http://schemas.microsoft.com/office/drawing/2014/main" id="{AB85C0C7-DC71-E549-9881-72D6630EAF11}"/>
+              </a:ext>
+            </a:extLst>
+          </p:cNvPr>
+          <p:cNvCxnSpPr/>
+          <p:nvPr/>
+        </p:nvCxnSpPr>
+        <p:spPr>
+          <a:xfrm flipV="1">
+            <a:off x="9563100" y="1168400"/>
+            <a:ext cx="1282700" cy="647700"/>
+          </a:xfrm>
+          <a:prstGeom prst="straightConnector1">
+            <a:avLst/>
+          </a:prstGeom>
+          <a:ln>
+            <a:tailEnd type="triangle"/>
+          </a:ln>
+        </p:spPr>
+        <p:style>
+          <a:lnRef idx="2">
+            <a:schemeClr val="accent1"/>
+          </a:lnRef>
+          <a:fillRef idx="0">
+            <a:schemeClr val="accent1"/>
+          </a:fillRef>
+          <a:effectRef idx="1">
+            <a:schemeClr val="accent1"/>
+          </a:effectRef>
+          <a:fontRef idx="minor">
+            <a:schemeClr val="tx1"/>
+          </a:fontRef>
+        </p:style>
+      </p:cxnSp>
+      <p:cxnSp>
+        <p:nvCxnSpPr>
+          <p:cNvPr id="7" name="Straight Arrow Connector 6">
+            <a:extLst>
+              <a:ext uri="{FF2B5EF4-FFF2-40B4-BE49-F238E27FC236}">
+                <a16:creationId xmlns:a16="http://schemas.microsoft.com/office/drawing/2014/main" id="{998F47AA-44D2-7745-9DA3-8331E67FF659}"/>
+              </a:ext>
+            </a:extLst>
+          </p:cNvPr>
+          <p:cNvCxnSpPr>
+            <a:cxnSpLocks/>
+          </p:cNvCxnSpPr>
+          <p:nvPr/>
+        </p:nvCxnSpPr>
+        <p:spPr>
+          <a:xfrm flipH="1" flipV="1">
+            <a:off x="10845800" y="1168400"/>
+            <a:ext cx="1143002" cy="585918"/>
+          </a:xfrm>
+          <a:prstGeom prst="straightConnector1">
+            <a:avLst/>
+          </a:prstGeom>
+          <a:ln>
+            <a:tailEnd type="triangle"/>
+          </a:ln>
+        </p:spPr>
+        <p:style>
+          <a:lnRef idx="2">
+            <a:schemeClr val="accent1"/>
+          </a:lnRef>
+          <a:fillRef idx="0">
+            <a:schemeClr val="accent1"/>
+          </a:fillRef>
+          <a:effectRef idx="1">
+            <a:schemeClr val="accent1"/>
+          </a:effectRef>
+          <a:fontRef idx="minor">
+            <a:schemeClr val="tx1"/>
+          </a:fontRef>
+        </p:style>
+      </p:cxnSp>
+      <p:sp>
+        <p:nvSpPr>
+          <p:cNvPr id="9" name="TextBox 8">
+            <a:extLst>
+              <a:ext uri="{FF2B5EF4-FFF2-40B4-BE49-F238E27FC236}">
+                <a16:creationId xmlns:a16="http://schemas.microsoft.com/office/drawing/2014/main" id="{F5C59E9A-3603-364B-8542-4A78F104C280}"/>
+              </a:ext>
+            </a:extLst>
+          </p:cNvPr>
+          <p:cNvSpPr txBox="1"/>
+          <p:nvPr/>
+        </p:nvSpPr>
+        <p:spPr>
+          <a:xfrm>
+            <a:off x="196850" y="2028468"/>
+            <a:ext cx="5181599" cy="1631216"/>
+          </a:xfrm>
+          <a:prstGeom prst="rect">
+            <a:avLst/>
+          </a:prstGeom>
+          <a:noFill/>
+          <a:ln>
+            <a:solidFill>
+              <a:schemeClr val="accent1"/>
+            </a:solidFill>
+          </a:ln>
+        </p:spPr>
+        <p:txBody>
+          <a:bodyPr wrap="square">
+            <a:spAutoFit/>
+          </a:bodyPr>
+          <a:lstStyle/>
+          <a:p>
+            <a:r>
+              <a:rPr lang="en-US" b="1" dirty="0">
+                <a:solidFill>
+                  <a:srgbClr val="073642"/>
+                </a:solidFill>
+                <a:effectLst/>
+                <a:latin typeface="Menlo" panose="020B0609030804020204" pitchFamily="49" charset="0"/>
+              </a:rPr>
+              <a:t>public</a:t>
+            </a:r>
+            <a:r>
+              <a:rPr lang="en-US" b="0" dirty="0">
+                <a:solidFill>
+                  <a:srgbClr val="333333"/>
+                </a:solidFill>
+                <a:effectLst/>
+                <a:latin typeface="Menlo" panose="020B0609030804020204" pitchFamily="49" charset="0"/>
+              </a:rPr>
+              <a:t> </a:t>
+            </a:r>
+            <a:r>
+              <a:rPr lang="en-US" b="1" dirty="0">
+                <a:solidFill>
+                  <a:srgbClr val="073642"/>
+                </a:solidFill>
+                <a:effectLst/>
+                <a:latin typeface="Menlo" panose="020B0609030804020204" pitchFamily="49" charset="0"/>
+              </a:rPr>
+              <a:t>class</a:t>
+            </a:r>
+            <a:r>
+              <a:rPr lang="en-US" b="0" dirty="0">
+                <a:solidFill>
+                  <a:srgbClr val="333333"/>
+                </a:solidFill>
+                <a:effectLst/>
+                <a:latin typeface="Menlo" panose="020B0609030804020204" pitchFamily="49" charset="0"/>
+              </a:rPr>
+              <a:t> </a:t>
+            </a:r>
+            <a:r>
+              <a:rPr lang="en-US" b="0" dirty="0">
+                <a:solidFill>
+                  <a:srgbClr val="268BD2"/>
+                </a:solidFill>
+                <a:effectLst/>
+                <a:latin typeface="Menlo" panose="020B0609030804020204" pitchFamily="49" charset="0"/>
+              </a:rPr>
+              <a:t>Shape</a:t>
+            </a:r>
+            <a:r>
+              <a:rPr lang="en-US" b="0" dirty="0">
+                <a:solidFill>
+                  <a:srgbClr val="333333"/>
+                </a:solidFill>
+                <a:effectLst/>
+                <a:latin typeface="Menlo" panose="020B0609030804020204" pitchFamily="49" charset="0"/>
+              </a:rPr>
+              <a:t> { </a:t>
+            </a:r>
+          </a:p>
+          <a:p>
+            <a:r>
+              <a:rPr lang="en-US" b="1" dirty="0">
+                <a:solidFill>
+                  <a:srgbClr val="073642"/>
+                </a:solidFill>
+                <a:effectLst/>
+                <a:latin typeface="Menlo" panose="020B0609030804020204" pitchFamily="49" charset="0"/>
+              </a:rPr>
+              <a:t>	public</a:t>
+            </a:r>
+            <a:r>
+              <a:rPr lang="en-US" b="0" dirty="0">
+                <a:solidFill>
+                  <a:srgbClr val="333333"/>
+                </a:solidFill>
+                <a:effectLst/>
+                <a:latin typeface="Menlo" panose="020B0609030804020204" pitchFamily="49" charset="0"/>
+              </a:rPr>
+              <a:t> </a:t>
+            </a:r>
+            <a:r>
+              <a:rPr lang="en-US" b="1" dirty="0">
+                <a:solidFill>
+                  <a:srgbClr val="073642"/>
+                </a:solidFill>
+                <a:effectLst/>
+                <a:latin typeface="Menlo" panose="020B0609030804020204" pitchFamily="49" charset="0"/>
+              </a:rPr>
+              <a:t>double</a:t>
+            </a:r>
+            <a:r>
+              <a:rPr lang="en-US" b="0" dirty="0">
+                <a:solidFill>
+                  <a:srgbClr val="333333"/>
+                </a:solidFill>
+                <a:effectLst/>
+                <a:latin typeface="Menlo" panose="020B0609030804020204" pitchFamily="49" charset="0"/>
+              </a:rPr>
+              <a:t> </a:t>
+            </a:r>
+            <a:r>
+              <a:rPr lang="en-US" b="0" dirty="0" err="1">
+                <a:solidFill>
+                  <a:srgbClr val="268BD2"/>
+                </a:solidFill>
+                <a:effectLst/>
+                <a:latin typeface="Menlo" panose="020B0609030804020204" pitchFamily="49" charset="0"/>
+              </a:rPr>
+              <a:t>computeArea</a:t>
+            </a:r>
+            <a:r>
+              <a:rPr lang="en-US" b="0" dirty="0">
+                <a:solidFill>
+                  <a:srgbClr val="333333"/>
+                </a:solidFill>
+                <a:effectLst/>
+                <a:latin typeface="Menlo" panose="020B0609030804020204" pitchFamily="49" charset="0"/>
+              </a:rPr>
+              <a:t>() {</a:t>
+            </a:r>
+          </a:p>
+          <a:p>
+            <a:r>
+              <a:rPr lang="en-US" b="0" dirty="0">
+                <a:solidFill>
+                  <a:srgbClr val="859900"/>
+                </a:solidFill>
+                <a:effectLst/>
+                <a:latin typeface="Menlo" panose="020B0609030804020204" pitchFamily="49" charset="0"/>
+              </a:rPr>
+              <a:t>		return</a:t>
+            </a:r>
+            <a:r>
+              <a:rPr lang="en-US" b="0" dirty="0">
+                <a:solidFill>
+                  <a:srgbClr val="333333"/>
+                </a:solidFill>
+                <a:effectLst/>
+                <a:latin typeface="Menlo" panose="020B0609030804020204" pitchFamily="49" charset="0"/>
+              </a:rPr>
+              <a:t> </a:t>
+            </a:r>
+            <a:r>
+              <a:rPr lang="en-US" b="0" dirty="0">
+                <a:solidFill>
+                  <a:srgbClr val="D33682"/>
+                </a:solidFill>
+                <a:effectLst/>
+                <a:latin typeface="Menlo" panose="020B0609030804020204" pitchFamily="49" charset="0"/>
+              </a:rPr>
+              <a:t>0</a:t>
+            </a:r>
+            <a:r>
+              <a:rPr lang="en-US" b="0" dirty="0">
+                <a:solidFill>
+                  <a:srgbClr val="333333"/>
+                </a:solidFill>
+                <a:effectLst/>
+                <a:latin typeface="Menlo" panose="020B0609030804020204" pitchFamily="49" charset="0"/>
+              </a:rPr>
+              <a:t>; </a:t>
+            </a:r>
+          </a:p>
+          <a:p>
+            <a:r>
+              <a:rPr lang="en-US" b="0" dirty="0">
+                <a:solidFill>
+                  <a:srgbClr val="333333"/>
+                </a:solidFill>
+                <a:effectLst/>
+                <a:latin typeface="Menlo" panose="020B0609030804020204" pitchFamily="49" charset="0"/>
+              </a:rPr>
+              <a:t>	}</a:t>
+            </a:r>
+          </a:p>
+          <a:p>
+            <a:r>
+              <a:rPr lang="en-US" b="0" dirty="0">
+                <a:solidFill>
+                  <a:srgbClr val="333333"/>
+                </a:solidFill>
+                <a:effectLst/>
+                <a:latin typeface="Menlo" panose="020B0609030804020204" pitchFamily="49" charset="0"/>
+              </a:rPr>
+              <a:t>}</a:t>
+            </a:r>
+          </a:p>
+        </p:txBody>
+      </p:sp>
+      <p:sp>
+        <p:nvSpPr>
+          <p:cNvPr id="11" name="TextBox 10">
+            <a:extLst>
+              <a:ext uri="{FF2B5EF4-FFF2-40B4-BE49-F238E27FC236}">
+                <a16:creationId xmlns:a16="http://schemas.microsoft.com/office/drawing/2014/main" id="{C47BF433-9800-2F4D-A20A-C6E40994E7AD}"/>
+              </a:ext>
+            </a:extLst>
+          </p:cNvPr>
+          <p:cNvSpPr txBox="1"/>
+          <p:nvPr/>
+        </p:nvSpPr>
+        <p:spPr>
+          <a:xfrm>
+            <a:off x="196850" y="3886200"/>
+            <a:ext cx="6451600" cy="2862322"/>
+          </a:xfrm>
+          <a:prstGeom prst="rect">
+            <a:avLst/>
+          </a:prstGeom>
+          <a:noFill/>
+          <a:ln>
+            <a:solidFill>
+              <a:schemeClr val="accent1"/>
+            </a:solidFill>
+          </a:ln>
+        </p:spPr>
+        <p:txBody>
+          <a:bodyPr wrap="square">
+            <a:spAutoFit/>
+          </a:bodyPr>
+          <a:lstStyle/>
+          <a:p>
+            <a:r>
+              <a:rPr lang="en-US" b="1" dirty="0">
+                <a:solidFill>
+                  <a:srgbClr val="073642"/>
+                </a:solidFill>
+                <a:effectLst/>
+                <a:latin typeface="Menlo" panose="020B0609030804020204" pitchFamily="49" charset="0"/>
+              </a:rPr>
+              <a:t>public</a:t>
+            </a:r>
+            <a:r>
+              <a:rPr lang="en-US" b="0" dirty="0">
+                <a:solidFill>
+                  <a:srgbClr val="333333"/>
+                </a:solidFill>
+                <a:effectLst/>
+                <a:latin typeface="Menlo" panose="020B0609030804020204" pitchFamily="49" charset="0"/>
+              </a:rPr>
+              <a:t> </a:t>
+            </a:r>
+            <a:r>
+              <a:rPr lang="en-US" b="1" dirty="0">
+                <a:solidFill>
+                  <a:srgbClr val="073642"/>
+                </a:solidFill>
+                <a:effectLst/>
+                <a:latin typeface="Menlo" panose="020B0609030804020204" pitchFamily="49" charset="0"/>
+              </a:rPr>
+              <a:t>class</a:t>
+            </a:r>
+            <a:r>
+              <a:rPr lang="en-US" b="0" dirty="0">
+                <a:solidFill>
+                  <a:srgbClr val="333333"/>
+                </a:solidFill>
+                <a:effectLst/>
+                <a:latin typeface="Menlo" panose="020B0609030804020204" pitchFamily="49" charset="0"/>
+              </a:rPr>
+              <a:t> </a:t>
+            </a:r>
+            <a:r>
+              <a:rPr lang="en-US" b="0" dirty="0">
+                <a:solidFill>
+                  <a:srgbClr val="268BD2"/>
+                </a:solidFill>
+                <a:effectLst/>
+                <a:latin typeface="Menlo" panose="020B0609030804020204" pitchFamily="49" charset="0"/>
+              </a:rPr>
+              <a:t>Circle</a:t>
+            </a:r>
+            <a:r>
+              <a:rPr lang="en-US" b="0" dirty="0">
+                <a:solidFill>
+                  <a:srgbClr val="333333"/>
+                </a:solidFill>
+                <a:effectLst/>
+                <a:latin typeface="Menlo" panose="020B0609030804020204" pitchFamily="49" charset="0"/>
+              </a:rPr>
+              <a:t> </a:t>
+            </a:r>
+            <a:r>
+              <a:rPr lang="en-US" b="1" dirty="0">
+                <a:solidFill>
+                  <a:srgbClr val="073642"/>
+                </a:solidFill>
+                <a:effectLst/>
+                <a:latin typeface="Menlo" panose="020B0609030804020204" pitchFamily="49" charset="0"/>
+              </a:rPr>
+              <a:t>extends</a:t>
+            </a:r>
+            <a:r>
+              <a:rPr lang="en-US" b="0" dirty="0">
+                <a:solidFill>
+                  <a:srgbClr val="333333"/>
+                </a:solidFill>
+                <a:effectLst/>
+                <a:latin typeface="Menlo" panose="020B0609030804020204" pitchFamily="49" charset="0"/>
+              </a:rPr>
+              <a:t> </a:t>
+            </a:r>
+            <a:r>
+              <a:rPr lang="en-US" b="0" dirty="0">
+                <a:solidFill>
+                  <a:srgbClr val="268BD2"/>
+                </a:solidFill>
+                <a:effectLst/>
+                <a:latin typeface="Menlo" panose="020B0609030804020204" pitchFamily="49" charset="0"/>
+              </a:rPr>
+              <a:t>Shape</a:t>
+            </a:r>
+            <a:r>
+              <a:rPr lang="en-US" b="0" dirty="0">
+                <a:solidFill>
+                  <a:srgbClr val="333333"/>
+                </a:solidFill>
+                <a:effectLst/>
+                <a:latin typeface="Menlo" panose="020B0609030804020204" pitchFamily="49" charset="0"/>
+              </a:rPr>
+              <a:t> {</a:t>
+            </a:r>
+          </a:p>
+          <a:p>
+            <a:r>
+              <a:rPr lang="en-US" b="1" dirty="0">
+                <a:solidFill>
+                  <a:srgbClr val="073642"/>
+                </a:solidFill>
+                <a:effectLst/>
+                <a:latin typeface="Menlo" panose="020B0609030804020204" pitchFamily="49" charset="0"/>
+              </a:rPr>
+              <a:t>	private</a:t>
+            </a:r>
+            <a:r>
+              <a:rPr lang="en-US" b="0" dirty="0">
+                <a:solidFill>
+                  <a:srgbClr val="333333"/>
+                </a:solidFill>
+                <a:effectLst/>
+                <a:latin typeface="Menlo" panose="020B0609030804020204" pitchFamily="49" charset="0"/>
+              </a:rPr>
+              <a:t> </a:t>
+            </a:r>
+            <a:r>
+              <a:rPr lang="en-US" b="1" dirty="0">
+                <a:solidFill>
+                  <a:srgbClr val="073642"/>
+                </a:solidFill>
+                <a:effectLst/>
+                <a:latin typeface="Menlo" panose="020B0609030804020204" pitchFamily="49" charset="0"/>
+              </a:rPr>
+              <a:t>double</a:t>
+            </a:r>
+            <a:r>
+              <a:rPr lang="en-US" b="0" dirty="0">
+                <a:solidFill>
+                  <a:srgbClr val="333333"/>
+                </a:solidFill>
+                <a:effectLst/>
+                <a:latin typeface="Menlo" panose="020B0609030804020204" pitchFamily="49" charset="0"/>
+              </a:rPr>
+              <a:t> </a:t>
+            </a:r>
+            <a:r>
+              <a:rPr lang="en-US" b="0" dirty="0">
+                <a:solidFill>
+                  <a:srgbClr val="268BD2"/>
+                </a:solidFill>
+                <a:effectLst/>
+                <a:latin typeface="Menlo" panose="020B0609030804020204" pitchFamily="49" charset="0"/>
+              </a:rPr>
+              <a:t>radius</a:t>
+            </a:r>
+            <a:r>
+              <a:rPr lang="en-US" b="0" dirty="0">
+                <a:solidFill>
+                  <a:srgbClr val="333333"/>
+                </a:solidFill>
+                <a:effectLst/>
+                <a:latin typeface="Menlo" panose="020B0609030804020204" pitchFamily="49" charset="0"/>
+              </a:rPr>
+              <a:t> </a:t>
+            </a:r>
+            <a:r>
+              <a:rPr lang="en-US" b="0" dirty="0">
+                <a:solidFill>
+                  <a:srgbClr val="859900"/>
+                </a:solidFill>
+                <a:effectLst/>
+                <a:latin typeface="Menlo" panose="020B0609030804020204" pitchFamily="49" charset="0"/>
+              </a:rPr>
+              <a:t>=</a:t>
+            </a:r>
+            <a:r>
+              <a:rPr lang="en-US" b="0" dirty="0">
+                <a:solidFill>
+                  <a:srgbClr val="D33682"/>
+                </a:solidFill>
+                <a:effectLst/>
+                <a:latin typeface="Menlo" panose="020B0609030804020204" pitchFamily="49" charset="0"/>
+              </a:rPr>
+              <a:t>0</a:t>
+            </a:r>
+            <a:r>
+              <a:rPr lang="en-US" b="0" dirty="0">
+                <a:solidFill>
+                  <a:srgbClr val="333333"/>
+                </a:solidFill>
+                <a:effectLst/>
+                <a:latin typeface="Menlo" panose="020B0609030804020204" pitchFamily="49" charset="0"/>
+              </a:rPr>
+              <a:t>;</a:t>
+            </a:r>
+          </a:p>
+          <a:p>
+            <a:r>
+              <a:rPr lang="en-US" b="1" dirty="0">
+                <a:solidFill>
+                  <a:srgbClr val="073642"/>
+                </a:solidFill>
+                <a:effectLst/>
+                <a:latin typeface="Menlo" panose="020B0609030804020204" pitchFamily="49" charset="0"/>
+              </a:rPr>
+              <a:t>	private</a:t>
+            </a:r>
+            <a:r>
+              <a:rPr lang="en-US" b="0" dirty="0">
+                <a:solidFill>
+                  <a:srgbClr val="333333"/>
+                </a:solidFill>
+                <a:effectLst/>
+                <a:latin typeface="Menlo" panose="020B0609030804020204" pitchFamily="49" charset="0"/>
+              </a:rPr>
+              <a:t> </a:t>
+            </a:r>
+            <a:r>
+              <a:rPr lang="en-US" b="1" dirty="0">
+                <a:solidFill>
+                  <a:srgbClr val="268BD2"/>
+                </a:solidFill>
+                <a:effectLst/>
+                <a:latin typeface="Menlo" panose="020B0609030804020204" pitchFamily="49" charset="0"/>
+              </a:rPr>
+              <a:t>Point</a:t>
+            </a:r>
+            <a:r>
+              <a:rPr lang="en-US" b="0" dirty="0">
+                <a:solidFill>
+                  <a:srgbClr val="333333"/>
+                </a:solidFill>
+                <a:effectLst/>
+                <a:latin typeface="Menlo" panose="020B0609030804020204" pitchFamily="49" charset="0"/>
+              </a:rPr>
+              <a:t> </a:t>
+            </a:r>
+            <a:r>
+              <a:rPr lang="en-US" b="0" dirty="0">
+                <a:solidFill>
+                  <a:srgbClr val="268BD2"/>
+                </a:solidFill>
+                <a:effectLst/>
+                <a:latin typeface="Menlo" panose="020B0609030804020204" pitchFamily="49" charset="0"/>
+              </a:rPr>
+              <a:t>center</a:t>
+            </a:r>
+            <a:r>
+              <a:rPr lang="en-US" b="0" dirty="0">
+                <a:solidFill>
+                  <a:srgbClr val="333333"/>
+                </a:solidFill>
+                <a:effectLst/>
+                <a:latin typeface="Menlo" panose="020B0609030804020204" pitchFamily="49" charset="0"/>
+              </a:rPr>
+              <a:t>; </a:t>
+            </a:r>
+          </a:p>
+          <a:p>
+            <a:r>
+              <a:rPr lang="en-US" b="0" dirty="0">
+                <a:solidFill>
+                  <a:srgbClr val="333333"/>
+                </a:solidFill>
+                <a:effectLst/>
+                <a:latin typeface="Menlo" panose="020B0609030804020204" pitchFamily="49" charset="0"/>
+              </a:rPr>
+              <a:t>	</a:t>
+            </a:r>
+          </a:p>
+          <a:p>
+            <a:r>
+              <a:rPr lang="en-US" dirty="0">
+                <a:solidFill>
+                  <a:srgbClr val="333333"/>
+                </a:solidFill>
+                <a:latin typeface="Menlo" panose="020B0609030804020204" pitchFamily="49" charset="0"/>
+              </a:rPr>
+              <a:t>	</a:t>
+            </a:r>
+            <a:r>
+              <a:rPr lang="en-US" b="0" dirty="0">
+                <a:solidFill>
+                  <a:srgbClr val="333333"/>
+                </a:solidFill>
+                <a:effectLst/>
+                <a:latin typeface="Menlo" panose="020B0609030804020204" pitchFamily="49" charset="0"/>
+              </a:rPr>
+              <a:t>@</a:t>
+            </a:r>
+            <a:r>
+              <a:rPr lang="en-US" b="1" dirty="0">
+                <a:solidFill>
+                  <a:srgbClr val="073642"/>
+                </a:solidFill>
+                <a:effectLst/>
+                <a:latin typeface="Menlo" panose="020B0609030804020204" pitchFamily="49" charset="0"/>
+              </a:rPr>
+              <a:t>Override</a:t>
+            </a:r>
+            <a:endParaRPr lang="en-US" b="0" dirty="0">
+              <a:solidFill>
+                <a:srgbClr val="333333"/>
+              </a:solidFill>
+              <a:effectLst/>
+              <a:latin typeface="Menlo" panose="020B0609030804020204" pitchFamily="49" charset="0"/>
+            </a:endParaRPr>
+          </a:p>
+          <a:p>
+            <a:r>
+              <a:rPr lang="en-US" b="1" dirty="0">
+                <a:solidFill>
+                  <a:srgbClr val="073642"/>
+                </a:solidFill>
+                <a:effectLst/>
+                <a:latin typeface="Menlo" panose="020B0609030804020204" pitchFamily="49" charset="0"/>
+              </a:rPr>
+              <a:t>	public</a:t>
+            </a:r>
+            <a:r>
+              <a:rPr lang="en-US" b="0" dirty="0">
+                <a:solidFill>
+                  <a:srgbClr val="333333"/>
+                </a:solidFill>
+                <a:effectLst/>
+                <a:latin typeface="Menlo" panose="020B0609030804020204" pitchFamily="49" charset="0"/>
+              </a:rPr>
+              <a:t> </a:t>
+            </a:r>
+            <a:r>
+              <a:rPr lang="en-US" b="1" dirty="0">
+                <a:solidFill>
+                  <a:srgbClr val="073642"/>
+                </a:solidFill>
+                <a:effectLst/>
+                <a:latin typeface="Menlo" panose="020B0609030804020204" pitchFamily="49" charset="0"/>
+              </a:rPr>
+              <a:t>double</a:t>
+            </a:r>
+            <a:r>
+              <a:rPr lang="en-US" b="0" dirty="0">
+                <a:solidFill>
+                  <a:srgbClr val="333333"/>
+                </a:solidFill>
+                <a:effectLst/>
+                <a:latin typeface="Menlo" panose="020B0609030804020204" pitchFamily="49" charset="0"/>
+              </a:rPr>
+              <a:t> </a:t>
+            </a:r>
+            <a:r>
+              <a:rPr lang="en-US" b="0" dirty="0" err="1">
+                <a:solidFill>
+                  <a:srgbClr val="268BD2"/>
+                </a:solidFill>
+                <a:effectLst/>
+                <a:latin typeface="Menlo" panose="020B0609030804020204" pitchFamily="49" charset="0"/>
+              </a:rPr>
+              <a:t>computeArea</a:t>
+            </a:r>
+            <a:r>
+              <a:rPr lang="en-US" b="0" dirty="0">
+                <a:solidFill>
+                  <a:srgbClr val="333333"/>
+                </a:solidFill>
+                <a:effectLst/>
+                <a:latin typeface="Menlo" panose="020B0609030804020204" pitchFamily="49" charset="0"/>
+              </a:rPr>
+              <a:t>() {</a:t>
+            </a:r>
+          </a:p>
+          <a:p>
+            <a:r>
+              <a:rPr lang="en-US" b="0" dirty="0">
+                <a:solidFill>
+                  <a:srgbClr val="859900"/>
+                </a:solidFill>
+                <a:effectLst/>
+                <a:latin typeface="Menlo" panose="020B0609030804020204" pitchFamily="49" charset="0"/>
+              </a:rPr>
+              <a:t>		return</a:t>
+            </a:r>
+            <a:r>
+              <a:rPr lang="en-US" b="0" dirty="0">
+                <a:solidFill>
+                  <a:srgbClr val="333333"/>
+                </a:solidFill>
+                <a:effectLst/>
+                <a:latin typeface="Menlo" panose="020B0609030804020204" pitchFamily="49" charset="0"/>
+              </a:rPr>
+              <a:t> </a:t>
+            </a:r>
+            <a:r>
+              <a:rPr lang="en-US" b="0" dirty="0" err="1">
+                <a:solidFill>
+                  <a:srgbClr val="268BD2"/>
+                </a:solidFill>
+                <a:effectLst/>
+                <a:latin typeface="Menlo" panose="020B0609030804020204" pitchFamily="49" charset="0"/>
+              </a:rPr>
+              <a:t>Math</a:t>
+            </a:r>
+            <a:r>
+              <a:rPr lang="en-US" b="0" dirty="0" err="1">
+                <a:solidFill>
+                  <a:srgbClr val="333333"/>
+                </a:solidFill>
+                <a:effectLst/>
+                <a:latin typeface="Menlo" panose="020B0609030804020204" pitchFamily="49" charset="0"/>
+              </a:rPr>
+              <a:t>.</a:t>
+            </a:r>
+            <a:r>
+              <a:rPr lang="en-US" b="0" dirty="0" err="1">
+                <a:solidFill>
+                  <a:srgbClr val="268BD2"/>
+                </a:solidFill>
+                <a:effectLst/>
+                <a:latin typeface="Menlo" panose="020B0609030804020204" pitchFamily="49" charset="0"/>
+              </a:rPr>
+              <a:t>PI</a:t>
+            </a:r>
+            <a:r>
+              <a:rPr lang="en-US" b="0" dirty="0">
+                <a:solidFill>
+                  <a:srgbClr val="333333"/>
+                </a:solidFill>
+                <a:effectLst/>
+                <a:latin typeface="Menlo" panose="020B0609030804020204" pitchFamily="49" charset="0"/>
+              </a:rPr>
+              <a:t> </a:t>
+            </a:r>
+            <a:r>
+              <a:rPr lang="en-US" b="0" dirty="0">
+                <a:solidFill>
+                  <a:srgbClr val="859900"/>
+                </a:solidFill>
+                <a:effectLst/>
+                <a:latin typeface="Menlo" panose="020B0609030804020204" pitchFamily="49" charset="0"/>
+              </a:rPr>
+              <a:t>*</a:t>
+            </a:r>
+            <a:r>
+              <a:rPr lang="en-US" b="0" dirty="0">
+                <a:solidFill>
+                  <a:srgbClr val="333333"/>
+                </a:solidFill>
+                <a:effectLst/>
+                <a:latin typeface="Menlo" panose="020B0609030804020204" pitchFamily="49" charset="0"/>
+              </a:rPr>
+              <a:t> (</a:t>
+            </a:r>
+            <a:r>
+              <a:rPr lang="en-US" b="0" dirty="0">
+                <a:solidFill>
+                  <a:srgbClr val="268BD2"/>
+                </a:solidFill>
+                <a:effectLst/>
+                <a:latin typeface="Menlo" panose="020B0609030804020204" pitchFamily="49" charset="0"/>
+              </a:rPr>
+              <a:t>radius</a:t>
+            </a:r>
+            <a:r>
+              <a:rPr lang="en-US" b="0" dirty="0">
+                <a:solidFill>
+                  <a:srgbClr val="859900"/>
+                </a:solidFill>
+                <a:effectLst/>
+                <a:latin typeface="Menlo" panose="020B0609030804020204" pitchFamily="49" charset="0"/>
+              </a:rPr>
+              <a:t>*</a:t>
+            </a:r>
+            <a:r>
+              <a:rPr lang="en-US" b="0" dirty="0">
+                <a:solidFill>
+                  <a:srgbClr val="268BD2"/>
+                </a:solidFill>
+                <a:effectLst/>
+                <a:latin typeface="Menlo" panose="020B0609030804020204" pitchFamily="49" charset="0"/>
+              </a:rPr>
+              <a:t>radius</a:t>
+            </a:r>
+            <a:r>
+              <a:rPr lang="en-US" b="0" dirty="0">
+                <a:solidFill>
+                  <a:srgbClr val="333333"/>
+                </a:solidFill>
+                <a:effectLst/>
+                <a:latin typeface="Menlo" panose="020B0609030804020204" pitchFamily="49" charset="0"/>
+              </a:rPr>
+              <a:t>);</a:t>
+            </a:r>
+          </a:p>
+          <a:p>
+            <a:r>
+              <a:rPr lang="en-US" b="0" dirty="0">
+                <a:solidFill>
+                  <a:srgbClr val="333333"/>
+                </a:solidFill>
+                <a:effectLst/>
+                <a:latin typeface="Menlo" panose="020B0609030804020204" pitchFamily="49" charset="0"/>
+              </a:rPr>
+              <a:t>	}</a:t>
+            </a:r>
+          </a:p>
+          <a:p>
+            <a:r>
+              <a:rPr lang="en-US" b="0" dirty="0">
+                <a:solidFill>
+                  <a:srgbClr val="333333"/>
+                </a:solidFill>
+                <a:effectLst/>
+                <a:latin typeface="Menlo" panose="020B0609030804020204" pitchFamily="49" charset="0"/>
+              </a:rPr>
+              <a:t>}</a:t>
+            </a:r>
+          </a:p>
+        </p:txBody>
+      </p:sp>
+      <p:sp>
+        <p:nvSpPr>
+          <p:cNvPr id="13" name="TextBox 12">
+            <a:extLst>
+              <a:ext uri="{FF2B5EF4-FFF2-40B4-BE49-F238E27FC236}">
+                <a16:creationId xmlns:a16="http://schemas.microsoft.com/office/drawing/2014/main" id="{2807F77D-576E-9142-A8D1-C232F1320B3B}"/>
+              </a:ext>
+            </a:extLst>
+          </p:cNvPr>
+          <p:cNvSpPr txBox="1"/>
+          <p:nvPr/>
+        </p:nvSpPr>
+        <p:spPr>
+          <a:xfrm>
+            <a:off x="7435850" y="3886200"/>
+            <a:ext cx="6184900" cy="2862322"/>
+          </a:xfrm>
+          <a:prstGeom prst="rect">
+            <a:avLst/>
+          </a:prstGeom>
+          <a:noFill/>
+          <a:ln>
+            <a:solidFill>
+              <a:schemeClr val="accent1"/>
+            </a:solidFill>
+          </a:ln>
+        </p:spPr>
+        <p:txBody>
+          <a:bodyPr wrap="square">
+            <a:spAutoFit/>
+          </a:bodyPr>
+          <a:lstStyle/>
+          <a:p>
+            <a:r>
+              <a:rPr lang="en-US" b="1" dirty="0">
+                <a:solidFill>
+                  <a:srgbClr val="073642"/>
+                </a:solidFill>
+                <a:effectLst/>
+                <a:latin typeface="Menlo" panose="020B0609030804020204" pitchFamily="49" charset="0"/>
+              </a:rPr>
+              <a:t>public</a:t>
+            </a:r>
+            <a:r>
+              <a:rPr lang="en-US" b="0" dirty="0">
+                <a:solidFill>
+                  <a:srgbClr val="333333"/>
+                </a:solidFill>
+                <a:effectLst/>
+                <a:latin typeface="Menlo" panose="020B0609030804020204" pitchFamily="49" charset="0"/>
+              </a:rPr>
+              <a:t> </a:t>
+            </a:r>
+            <a:r>
+              <a:rPr lang="en-US" b="1" dirty="0">
+                <a:solidFill>
+                  <a:srgbClr val="073642"/>
+                </a:solidFill>
+                <a:effectLst/>
+                <a:latin typeface="Menlo" panose="020B0609030804020204" pitchFamily="49" charset="0"/>
+              </a:rPr>
+              <a:t>class</a:t>
+            </a:r>
+            <a:r>
+              <a:rPr lang="en-US" b="0" dirty="0">
+                <a:solidFill>
+                  <a:srgbClr val="333333"/>
+                </a:solidFill>
+                <a:effectLst/>
+                <a:latin typeface="Menlo" panose="020B0609030804020204" pitchFamily="49" charset="0"/>
+              </a:rPr>
+              <a:t> </a:t>
+            </a:r>
+            <a:r>
+              <a:rPr lang="en-US" b="0" dirty="0">
+                <a:solidFill>
+                  <a:srgbClr val="268BD2"/>
+                </a:solidFill>
+                <a:effectLst/>
+                <a:latin typeface="Menlo" panose="020B0609030804020204" pitchFamily="49" charset="0"/>
+              </a:rPr>
+              <a:t>Square</a:t>
+            </a:r>
+            <a:r>
+              <a:rPr lang="en-US" b="0" dirty="0">
+                <a:solidFill>
+                  <a:srgbClr val="333333"/>
+                </a:solidFill>
+                <a:effectLst/>
+                <a:latin typeface="Menlo" panose="020B0609030804020204" pitchFamily="49" charset="0"/>
+              </a:rPr>
+              <a:t> </a:t>
+            </a:r>
+            <a:r>
+              <a:rPr lang="en-US" b="1" dirty="0">
+                <a:solidFill>
+                  <a:srgbClr val="073642"/>
+                </a:solidFill>
+                <a:effectLst/>
+                <a:latin typeface="Menlo" panose="020B0609030804020204" pitchFamily="49" charset="0"/>
+              </a:rPr>
+              <a:t>extends</a:t>
+            </a:r>
+            <a:r>
+              <a:rPr lang="en-US" b="0" dirty="0">
+                <a:solidFill>
+                  <a:srgbClr val="333333"/>
+                </a:solidFill>
+                <a:effectLst/>
+                <a:latin typeface="Menlo" panose="020B0609030804020204" pitchFamily="49" charset="0"/>
+              </a:rPr>
+              <a:t> </a:t>
+            </a:r>
+            <a:r>
+              <a:rPr lang="en-US" b="0" dirty="0">
+                <a:solidFill>
+                  <a:srgbClr val="268BD2"/>
+                </a:solidFill>
+                <a:effectLst/>
+                <a:latin typeface="Menlo" panose="020B0609030804020204" pitchFamily="49" charset="0"/>
+              </a:rPr>
+              <a:t>Shape</a:t>
+            </a:r>
+            <a:r>
+              <a:rPr lang="en-US" b="0" dirty="0">
+                <a:solidFill>
+                  <a:srgbClr val="333333"/>
+                </a:solidFill>
+                <a:effectLst/>
+                <a:latin typeface="Menlo" panose="020B0609030804020204" pitchFamily="49" charset="0"/>
+              </a:rPr>
+              <a:t> {</a:t>
+            </a:r>
+          </a:p>
+          <a:p>
+            <a:r>
+              <a:rPr lang="en-US" b="1" dirty="0">
+                <a:solidFill>
+                  <a:srgbClr val="073642"/>
+                </a:solidFill>
+                <a:effectLst/>
+                <a:latin typeface="Menlo" panose="020B0609030804020204" pitchFamily="49" charset="0"/>
+              </a:rPr>
+              <a:t>	private</a:t>
+            </a:r>
+            <a:r>
+              <a:rPr lang="en-US" b="0" dirty="0">
+                <a:solidFill>
+                  <a:srgbClr val="333333"/>
+                </a:solidFill>
+                <a:effectLst/>
+                <a:latin typeface="Menlo" panose="020B0609030804020204" pitchFamily="49" charset="0"/>
+              </a:rPr>
+              <a:t> </a:t>
+            </a:r>
+            <a:r>
+              <a:rPr lang="en-US" b="1" dirty="0">
+                <a:solidFill>
+                  <a:srgbClr val="073642"/>
+                </a:solidFill>
+                <a:effectLst/>
+                <a:latin typeface="Menlo" panose="020B0609030804020204" pitchFamily="49" charset="0"/>
+              </a:rPr>
+              <a:t>double</a:t>
+            </a:r>
+            <a:r>
+              <a:rPr lang="en-US" b="0" dirty="0">
+                <a:solidFill>
+                  <a:srgbClr val="333333"/>
+                </a:solidFill>
+                <a:effectLst/>
+                <a:latin typeface="Menlo" panose="020B0609030804020204" pitchFamily="49" charset="0"/>
+              </a:rPr>
+              <a:t> </a:t>
+            </a:r>
+            <a:r>
+              <a:rPr lang="en-US" b="0" dirty="0">
+                <a:solidFill>
+                  <a:srgbClr val="268BD2"/>
+                </a:solidFill>
+                <a:effectLst/>
+                <a:latin typeface="Menlo" panose="020B0609030804020204" pitchFamily="49" charset="0"/>
+              </a:rPr>
+              <a:t>size</a:t>
+            </a:r>
+            <a:r>
+              <a:rPr lang="en-US" b="0" dirty="0">
+                <a:solidFill>
+                  <a:srgbClr val="333333"/>
+                </a:solidFill>
+                <a:effectLst/>
+                <a:latin typeface="Menlo" panose="020B0609030804020204" pitchFamily="49" charset="0"/>
+              </a:rPr>
+              <a:t> </a:t>
+            </a:r>
+            <a:r>
+              <a:rPr lang="en-US" b="0" dirty="0">
+                <a:solidFill>
+                  <a:srgbClr val="859900"/>
+                </a:solidFill>
+                <a:effectLst/>
+                <a:latin typeface="Menlo" panose="020B0609030804020204" pitchFamily="49" charset="0"/>
+              </a:rPr>
+              <a:t>=</a:t>
+            </a:r>
+            <a:r>
+              <a:rPr lang="en-US" b="0" dirty="0">
+                <a:solidFill>
+                  <a:srgbClr val="333333"/>
+                </a:solidFill>
+                <a:effectLst/>
+                <a:latin typeface="Menlo" panose="020B0609030804020204" pitchFamily="49" charset="0"/>
+              </a:rPr>
+              <a:t> </a:t>
+            </a:r>
+            <a:r>
+              <a:rPr lang="en-US" b="0" dirty="0">
+                <a:solidFill>
+                  <a:srgbClr val="D33682"/>
+                </a:solidFill>
+                <a:effectLst/>
+                <a:latin typeface="Menlo" panose="020B0609030804020204" pitchFamily="49" charset="0"/>
+              </a:rPr>
+              <a:t>0</a:t>
+            </a:r>
+            <a:r>
+              <a:rPr lang="en-US" b="0" dirty="0">
+                <a:solidFill>
+                  <a:srgbClr val="333333"/>
+                </a:solidFill>
+                <a:effectLst/>
+                <a:latin typeface="Menlo" panose="020B0609030804020204" pitchFamily="49" charset="0"/>
+              </a:rPr>
+              <a:t>;</a:t>
+            </a:r>
+          </a:p>
+          <a:p>
+            <a:r>
+              <a:rPr lang="en-US" b="1" dirty="0">
+                <a:solidFill>
+                  <a:srgbClr val="073642"/>
+                </a:solidFill>
+                <a:effectLst/>
+                <a:latin typeface="Menlo" panose="020B0609030804020204" pitchFamily="49" charset="0"/>
+              </a:rPr>
+              <a:t>	private</a:t>
+            </a:r>
+            <a:r>
+              <a:rPr lang="en-US" b="0" dirty="0">
+                <a:solidFill>
+                  <a:srgbClr val="333333"/>
+                </a:solidFill>
+                <a:effectLst/>
+                <a:latin typeface="Menlo" panose="020B0609030804020204" pitchFamily="49" charset="0"/>
+              </a:rPr>
+              <a:t> </a:t>
+            </a:r>
+            <a:r>
+              <a:rPr lang="en-US" b="1" dirty="0">
+                <a:solidFill>
+                  <a:srgbClr val="268BD2"/>
+                </a:solidFill>
+                <a:effectLst/>
+                <a:latin typeface="Menlo" panose="020B0609030804020204" pitchFamily="49" charset="0"/>
+              </a:rPr>
+              <a:t>Point</a:t>
+            </a:r>
+            <a:r>
+              <a:rPr lang="en-US" b="0" dirty="0">
+                <a:solidFill>
+                  <a:srgbClr val="333333"/>
+                </a:solidFill>
+                <a:effectLst/>
+                <a:latin typeface="Menlo" panose="020B0609030804020204" pitchFamily="49" charset="0"/>
+              </a:rPr>
+              <a:t> </a:t>
+            </a:r>
+            <a:r>
+              <a:rPr lang="en-US" b="0" dirty="0">
+                <a:solidFill>
+                  <a:srgbClr val="268BD2"/>
+                </a:solidFill>
+                <a:effectLst/>
+                <a:latin typeface="Menlo" panose="020B0609030804020204" pitchFamily="49" charset="0"/>
+              </a:rPr>
+              <a:t>center</a:t>
+            </a:r>
+            <a:r>
+              <a:rPr lang="en-US" b="0" dirty="0">
+                <a:solidFill>
+                  <a:srgbClr val="333333"/>
+                </a:solidFill>
+                <a:effectLst/>
+                <a:latin typeface="Menlo" panose="020B0609030804020204" pitchFamily="49" charset="0"/>
+              </a:rPr>
+              <a:t>;</a:t>
+            </a:r>
+          </a:p>
+          <a:p>
+            <a:br>
+              <a:rPr lang="en-US" b="0" dirty="0">
+                <a:solidFill>
+                  <a:srgbClr val="333333"/>
+                </a:solidFill>
+                <a:effectLst/>
+                <a:latin typeface="Menlo" panose="020B0609030804020204" pitchFamily="49" charset="0"/>
+              </a:rPr>
+            </a:br>
+            <a:r>
+              <a:rPr lang="en-US" b="0" dirty="0">
+                <a:solidFill>
+                  <a:srgbClr val="333333"/>
+                </a:solidFill>
+                <a:effectLst/>
+                <a:latin typeface="Menlo" panose="020B0609030804020204" pitchFamily="49" charset="0"/>
+              </a:rPr>
+              <a:t>	@</a:t>
+            </a:r>
+            <a:r>
+              <a:rPr lang="en-US" b="1" dirty="0">
+                <a:solidFill>
+                  <a:srgbClr val="073642"/>
+                </a:solidFill>
+                <a:effectLst/>
+                <a:latin typeface="Menlo" panose="020B0609030804020204" pitchFamily="49" charset="0"/>
+              </a:rPr>
+              <a:t>Override</a:t>
+            </a:r>
+            <a:endParaRPr lang="en-US" b="0" dirty="0">
+              <a:solidFill>
+                <a:srgbClr val="333333"/>
+              </a:solidFill>
+              <a:effectLst/>
+              <a:latin typeface="Menlo" panose="020B0609030804020204" pitchFamily="49" charset="0"/>
+            </a:endParaRPr>
+          </a:p>
+          <a:p>
+            <a:r>
+              <a:rPr lang="en-US" b="1" dirty="0">
+                <a:solidFill>
+                  <a:srgbClr val="073642"/>
+                </a:solidFill>
+                <a:effectLst/>
+                <a:latin typeface="Menlo" panose="020B0609030804020204" pitchFamily="49" charset="0"/>
+              </a:rPr>
+              <a:t>	public</a:t>
+            </a:r>
+            <a:r>
+              <a:rPr lang="en-US" b="0" dirty="0">
+                <a:solidFill>
+                  <a:srgbClr val="333333"/>
+                </a:solidFill>
+                <a:effectLst/>
+                <a:latin typeface="Menlo" panose="020B0609030804020204" pitchFamily="49" charset="0"/>
+              </a:rPr>
+              <a:t> </a:t>
+            </a:r>
+            <a:r>
+              <a:rPr lang="en-US" b="1" dirty="0">
+                <a:solidFill>
+                  <a:srgbClr val="073642"/>
+                </a:solidFill>
+                <a:effectLst/>
+                <a:latin typeface="Menlo" panose="020B0609030804020204" pitchFamily="49" charset="0"/>
+              </a:rPr>
+              <a:t>double</a:t>
+            </a:r>
+            <a:r>
+              <a:rPr lang="en-US" b="0" dirty="0">
+                <a:solidFill>
+                  <a:srgbClr val="333333"/>
+                </a:solidFill>
+                <a:effectLst/>
+                <a:latin typeface="Menlo" panose="020B0609030804020204" pitchFamily="49" charset="0"/>
+              </a:rPr>
+              <a:t> </a:t>
+            </a:r>
+            <a:r>
+              <a:rPr lang="en-US" b="0" dirty="0" err="1">
+                <a:solidFill>
+                  <a:srgbClr val="268BD2"/>
+                </a:solidFill>
+                <a:effectLst/>
+                <a:latin typeface="Menlo" panose="020B0609030804020204" pitchFamily="49" charset="0"/>
+              </a:rPr>
+              <a:t>computeArea</a:t>
+            </a:r>
+            <a:r>
+              <a:rPr lang="en-US" b="0" dirty="0">
+                <a:solidFill>
+                  <a:srgbClr val="333333"/>
+                </a:solidFill>
+                <a:effectLst/>
+                <a:latin typeface="Menlo" panose="020B0609030804020204" pitchFamily="49" charset="0"/>
+              </a:rPr>
+              <a:t>() {</a:t>
+            </a:r>
+          </a:p>
+          <a:p>
+            <a:r>
+              <a:rPr lang="en-US" b="0" dirty="0">
+                <a:solidFill>
+                  <a:srgbClr val="859900"/>
+                </a:solidFill>
+                <a:effectLst/>
+                <a:latin typeface="Menlo" panose="020B0609030804020204" pitchFamily="49" charset="0"/>
+              </a:rPr>
+              <a:t>		return</a:t>
+            </a:r>
+            <a:r>
+              <a:rPr lang="en-US" b="0" dirty="0">
+                <a:solidFill>
+                  <a:srgbClr val="333333"/>
+                </a:solidFill>
+                <a:effectLst/>
+                <a:latin typeface="Menlo" panose="020B0609030804020204" pitchFamily="49" charset="0"/>
+              </a:rPr>
+              <a:t> </a:t>
+            </a:r>
+            <a:r>
+              <a:rPr lang="en-US" b="0" dirty="0">
+                <a:solidFill>
+                  <a:srgbClr val="268BD2"/>
+                </a:solidFill>
+                <a:effectLst/>
+                <a:latin typeface="Menlo" panose="020B0609030804020204" pitchFamily="49" charset="0"/>
+              </a:rPr>
+              <a:t>size</a:t>
+            </a:r>
+            <a:r>
+              <a:rPr lang="en-US" b="0" dirty="0">
+                <a:solidFill>
+                  <a:srgbClr val="859900"/>
+                </a:solidFill>
+                <a:effectLst/>
+                <a:latin typeface="Menlo" panose="020B0609030804020204" pitchFamily="49" charset="0"/>
+              </a:rPr>
+              <a:t>*</a:t>
+            </a:r>
+            <a:r>
+              <a:rPr lang="en-US" b="0" dirty="0">
+                <a:solidFill>
+                  <a:srgbClr val="268BD2"/>
+                </a:solidFill>
+                <a:effectLst/>
+                <a:latin typeface="Menlo" panose="020B0609030804020204" pitchFamily="49" charset="0"/>
+              </a:rPr>
+              <a:t>size</a:t>
+            </a:r>
+            <a:r>
+              <a:rPr lang="en-US" b="0" dirty="0">
+                <a:solidFill>
+                  <a:srgbClr val="333333"/>
+                </a:solidFill>
+                <a:effectLst/>
+                <a:latin typeface="Menlo" panose="020B0609030804020204" pitchFamily="49" charset="0"/>
+              </a:rPr>
+              <a:t>;</a:t>
+            </a:r>
+          </a:p>
+          <a:p>
+            <a:r>
+              <a:rPr lang="en-US" b="0" dirty="0">
+                <a:solidFill>
+                  <a:srgbClr val="333333"/>
+                </a:solidFill>
+                <a:effectLst/>
+                <a:latin typeface="Menlo" panose="020B0609030804020204" pitchFamily="49" charset="0"/>
+              </a:rPr>
+              <a:t>	}</a:t>
+            </a:r>
+          </a:p>
+          <a:p>
+            <a:r>
+              <a:rPr lang="en-US" b="0" dirty="0">
+                <a:solidFill>
+                  <a:srgbClr val="333333"/>
+                </a:solidFill>
+                <a:effectLst/>
+                <a:latin typeface="Menlo" panose="020B0609030804020204" pitchFamily="49" charset="0"/>
+              </a:rPr>
+              <a:t>}</a:t>
+            </a:r>
+          </a:p>
+        </p:txBody>
+      </p:sp>
+      <p:sp>
+        <p:nvSpPr>
+          <p:cNvPr id="14" name="TextBox 13">
+            <a:extLst>
+              <a:ext uri="{FF2B5EF4-FFF2-40B4-BE49-F238E27FC236}">
+                <a16:creationId xmlns:a16="http://schemas.microsoft.com/office/drawing/2014/main" id="{0FD17A4B-46FE-CF4B-8B4D-DC876E710959}"/>
+              </a:ext>
+            </a:extLst>
+          </p:cNvPr>
+          <p:cNvSpPr txBox="1"/>
+          <p:nvPr/>
+        </p:nvSpPr>
+        <p:spPr>
+          <a:xfrm>
+            <a:off x="8445500" y="6954173"/>
+            <a:ext cx="5056192" cy="400110"/>
+          </a:xfrm>
+          <a:prstGeom prst="rect">
+            <a:avLst/>
+          </a:prstGeom>
+          <a:noFill/>
+        </p:spPr>
+        <p:txBody>
+          <a:bodyPr wrap="none" rtlCol="0">
+            <a:spAutoFit/>
+          </a:bodyPr>
+          <a:lstStyle/>
+          <a:p>
+            <a:r>
+              <a:rPr lang="en-US" dirty="0"/>
+              <a:t>UML/Examples not complete – just an idea</a:t>
+            </a:r>
+          </a:p>
+        </p:txBody>
+      </p:sp>
+    </p:spTree>
+    <p:extLst>
+      <p:ext uri="{BB962C8B-B14F-4D97-AF65-F5344CB8AC3E}">
+        <p14:creationId xmlns:p14="http://schemas.microsoft.com/office/powerpoint/2010/main" val="801782618"/>
+      </p:ext>
+    </p:extLst>
+  </p:cSld>
+  <p:clrMapOvr>
+    <a:masterClrMapping/>
+  </p:clrMapOvr>
+  <mc:AlternateContent xmlns:mc="http://schemas.openxmlformats.org/markup-compatibility/2006" xmlns:p14="http://schemas.microsoft.com/office/powerpoint/2010/main">
+    <mc:Choice Requires="p14">
+      <p:transition p14:dur="300">
+        <p:fade/>
+      </p:transition>
+    </mc:Choice>
+    <mc:Fallback xmlns="">
+      <p:transition>
+        <p:fade/>
+      </p:transition>
+    </mc:Fallback>
+  </mc:AlternateContent>
+</p:sld>
+</file>
+
+<file path=ppt/slides/slide5.xml><?xml version="1.0" encoding="utf-8"?>
+<p:sld xmlns:a="http://schemas.openxmlformats.org/drawingml/2006/main" xmlns:r="http://schemas.openxmlformats.org/officeDocument/2006/relationships" xmlns:p="http://schemas.openxmlformats.org/presentationml/2006/main">
+  <p:cSld>
+    <p:spTree>
+      <p:nvGrpSpPr>
+        <p:cNvPr id="1" name=""/>
+        <p:cNvGrpSpPr/>
+        <p:nvPr/>
+      </p:nvGrpSpPr>
+      <p:grpSpPr>
+        <a:xfrm>
+          <a:off x="0" y="0"/>
+          <a:ext cx="0" cy="0"/>
+          <a:chOff x="0" y="0"/>
+          <a:chExt cx="0" cy="0"/>
+        </a:xfrm>
+      </p:grpSpPr>
+      <p:sp>
+        <p:nvSpPr>
+          <p:cNvPr id="2" name="Title 1">
+            <a:extLst>
+              <a:ext uri="{FF2B5EF4-FFF2-40B4-BE49-F238E27FC236}">
+                <a16:creationId xmlns:a16="http://schemas.microsoft.com/office/drawing/2014/main" id="{41AB1E95-8F70-F643-9716-BB9C92BA5E75}"/>
+              </a:ext>
+            </a:extLst>
+          </p:cNvPr>
+          <p:cNvSpPr>
+            <a:spLocks noGrp="1"/>
+          </p:cNvSpPr>
+          <p:nvPr>
+            <p:ph type="title"/>
+          </p:nvPr>
+        </p:nvSpPr>
+        <p:spPr/>
+        <p:txBody>
+          <a:bodyPr/>
+          <a:lstStyle/>
+          <a:p>
+            <a:r>
+              <a:rPr lang="en-US" dirty="0"/>
+              <a:t>Final Practical Project</a:t>
+            </a:r>
+          </a:p>
+        </p:txBody>
+      </p:sp>
+      <p:sp>
+        <p:nvSpPr>
+          <p:cNvPr id="3" name="Text Placeholder 2">
+            <a:extLst>
+              <a:ext uri="{FF2B5EF4-FFF2-40B4-BE49-F238E27FC236}">
+                <a16:creationId xmlns:a16="http://schemas.microsoft.com/office/drawing/2014/main" id="{69B3FF0A-7D98-3148-9763-05A304F7E672}"/>
+              </a:ext>
+            </a:extLst>
+          </p:cNvPr>
+          <p:cNvSpPr>
+            <a:spLocks noGrp="1"/>
+          </p:cNvSpPr>
+          <p:nvPr>
+            <p:ph type="body" sz="quarter" idx="10"/>
+          </p:nvPr>
+        </p:nvSpPr>
+        <p:spPr>
+          <a:xfrm>
+            <a:off x="628075" y="1776683"/>
+            <a:ext cx="7025792" cy="5251951"/>
+          </a:xfrm>
+        </p:spPr>
+        <p:txBody>
+          <a:bodyPr/>
+          <a:lstStyle/>
+          <a:p>
+            <a:r>
+              <a:rPr lang="en-US" dirty="0"/>
+              <a:t>Starting with the basic design of a program</a:t>
+            </a:r>
+          </a:p>
+          <a:p>
+            <a:pPr lvl="1"/>
+            <a:r>
+              <a:rPr lang="en-US" dirty="0"/>
+              <a:t>Both UML and Javadoc</a:t>
+            </a:r>
+          </a:p>
+          <a:p>
+            <a:pPr lvl="1"/>
+            <a:r>
+              <a:rPr lang="en-US" dirty="0"/>
+              <a:t>Let’s Look at the UML</a:t>
+            </a:r>
+          </a:p>
+          <a:p>
+            <a:r>
+              <a:rPr lang="en-US" dirty="0"/>
+              <a:t>Interfaces/Implements?</a:t>
+            </a:r>
+          </a:p>
+          <a:p>
+            <a:pPr lvl="1"/>
+            <a:r>
+              <a:rPr lang="en-US" dirty="0"/>
+              <a:t>Cover this after the exam - you can read ahead or just wait</a:t>
+            </a:r>
+          </a:p>
+          <a:p>
+            <a:pPr lvl="2"/>
+            <a:r>
+              <a:rPr lang="en-US" dirty="0"/>
+              <a:t>Essentially ‘contracts’ that require certain methods to be implemented in the class, so MOB has to have the 4 Attribute methods</a:t>
+            </a:r>
+          </a:p>
+          <a:p>
+            <a:r>
+              <a:rPr lang="en-US" dirty="0" err="1"/>
+              <a:t>AbstractClass</a:t>
+            </a:r>
+            <a:r>
+              <a:rPr lang="en-US" dirty="0"/>
+              <a:t>?</a:t>
+            </a:r>
+          </a:p>
+          <a:p>
+            <a:pPr lvl="1"/>
+            <a:r>
+              <a:rPr lang="en-US" dirty="0"/>
+              <a:t>Cover this after the exam – you can just wait, or read ahead</a:t>
+            </a:r>
+          </a:p>
+          <a:p>
+            <a:pPr lvl="2"/>
+            <a:r>
+              <a:rPr lang="en-US" dirty="0"/>
+              <a:t>Essentially partially implemented classes with </a:t>
+            </a:r>
+          </a:p>
+          <a:p>
+            <a:r>
+              <a:rPr lang="en-US" dirty="0"/>
+              <a:t>Looks like a lot</a:t>
+            </a:r>
+          </a:p>
+          <a:p>
+            <a:pPr lvl="1"/>
+            <a:r>
+              <a:rPr lang="en-US" dirty="0"/>
+              <a:t>Actually, a lot of one-line methods and small classes</a:t>
+            </a:r>
+          </a:p>
+        </p:txBody>
+      </p:sp>
+      <p:pic>
+        <p:nvPicPr>
+          <p:cNvPr id="4" name="Picture 3">
+            <a:extLst>
+              <a:ext uri="{FF2B5EF4-FFF2-40B4-BE49-F238E27FC236}">
+                <a16:creationId xmlns:a16="http://schemas.microsoft.com/office/drawing/2014/main" id="{49D898BE-6A00-2547-AEE9-BC8C3833769A}"/>
+              </a:ext>
+            </a:extLst>
+          </p:cNvPr>
+          <p:cNvPicPr>
+            <a:picLocks noChangeAspect="1"/>
+          </p:cNvPicPr>
+          <p:nvPr/>
+        </p:nvPicPr>
+        <p:blipFill>
+          <a:blip r:embed="rId2"/>
+          <a:stretch>
+            <a:fillRect/>
+          </a:stretch>
+        </p:blipFill>
+        <p:spPr>
+          <a:xfrm>
+            <a:off x="8139288" y="87724"/>
+            <a:ext cx="5599289" cy="7596952"/>
+          </a:xfrm>
+          <a:prstGeom prst="rect">
+            <a:avLst/>
+          </a:prstGeom>
+        </p:spPr>
+      </p:pic>
+    </p:spTree>
+    <p:extLst>
+      <p:ext uri="{BB962C8B-B14F-4D97-AF65-F5344CB8AC3E}">
+        <p14:creationId xmlns:p14="http://schemas.microsoft.com/office/powerpoint/2010/main" val="3913504256"/>
       </p:ext>
     </p:extLst>
   </p:cSld>

</xml_diff>